<commit_message>
Updated dummy Friends and Groups Lists rendering
</commit_message>
<xml_diff>
--- a/Docs/chatterbox-db-schemas.pptx
+++ b/Docs/chatterbox-db-schemas.pptx
@@ -7,6 +7,7 @@
   <p:sldIdLst>
     <p:sldId id="256" r:id="rId2"/>
     <p:sldId id="257" r:id="rId3"/>
+    <p:sldId id="258" r:id="rId4"/>
   </p:sldIdLst>
   <p:sldSz cx="12192000" cy="6858000"/>
   <p:notesSz cx="6858000" cy="9144000"/>
@@ -105,6 +106,11 @@
       </a:defRPr>
     </a:lvl9pPr>
   </p:defaultTextStyle>
+  <p:extLst>
+    <p:ext uri="{EFAFB233-063F-42B5-8137-9DF3F51BA10A}">
+      <p15:sldGuideLst xmlns:p15="http://schemas.microsoft.com/office/powerpoint/2012/main"/>
+    </p:ext>
+  </p:extLst>
 </p:presentation>
 </file>
 
@@ -255,7 +261,7 @@
           <a:p>
             <a:fld id="{C03C97F5-7789-BE4C-9397-C1EA5E034617}" type="datetimeFigureOut">
               <a:rPr lang="en-US" smtClean="0"/>
-              <a:t>4/11/21</a:t>
+              <a:t>4/12/21</a:t>
             </a:fld>
             <a:endParaRPr lang="en-US"/>
           </a:p>
@@ -453,7 +459,7 @@
           <a:p>
             <a:fld id="{C03C97F5-7789-BE4C-9397-C1EA5E034617}" type="datetimeFigureOut">
               <a:rPr lang="en-US" smtClean="0"/>
-              <a:t>4/11/21</a:t>
+              <a:t>4/12/21</a:t>
             </a:fld>
             <a:endParaRPr lang="en-US"/>
           </a:p>
@@ -661,7 +667,7 @@
           <a:p>
             <a:fld id="{C03C97F5-7789-BE4C-9397-C1EA5E034617}" type="datetimeFigureOut">
               <a:rPr lang="en-US" smtClean="0"/>
-              <a:t>4/11/21</a:t>
+              <a:t>4/12/21</a:t>
             </a:fld>
             <a:endParaRPr lang="en-US"/>
           </a:p>
@@ -859,7 +865,7 @@
           <a:p>
             <a:fld id="{C03C97F5-7789-BE4C-9397-C1EA5E034617}" type="datetimeFigureOut">
               <a:rPr lang="en-US" smtClean="0"/>
-              <a:t>4/11/21</a:t>
+              <a:t>4/12/21</a:t>
             </a:fld>
             <a:endParaRPr lang="en-US"/>
           </a:p>
@@ -1134,7 +1140,7 @@
           <a:p>
             <a:fld id="{C03C97F5-7789-BE4C-9397-C1EA5E034617}" type="datetimeFigureOut">
               <a:rPr lang="en-US" smtClean="0"/>
-              <a:t>4/11/21</a:t>
+              <a:t>4/12/21</a:t>
             </a:fld>
             <a:endParaRPr lang="en-US"/>
           </a:p>
@@ -1399,7 +1405,7 @@
           <a:p>
             <a:fld id="{C03C97F5-7789-BE4C-9397-C1EA5E034617}" type="datetimeFigureOut">
               <a:rPr lang="en-US" smtClean="0"/>
-              <a:t>4/11/21</a:t>
+              <a:t>4/12/21</a:t>
             </a:fld>
             <a:endParaRPr lang="en-US"/>
           </a:p>
@@ -1811,7 +1817,7 @@
           <a:p>
             <a:fld id="{C03C97F5-7789-BE4C-9397-C1EA5E034617}" type="datetimeFigureOut">
               <a:rPr lang="en-US" smtClean="0"/>
-              <a:t>4/11/21</a:t>
+              <a:t>4/12/21</a:t>
             </a:fld>
             <a:endParaRPr lang="en-US"/>
           </a:p>
@@ -1952,7 +1958,7 @@
           <a:p>
             <a:fld id="{C03C97F5-7789-BE4C-9397-C1EA5E034617}" type="datetimeFigureOut">
               <a:rPr lang="en-US" smtClean="0"/>
-              <a:t>4/11/21</a:t>
+              <a:t>4/12/21</a:t>
             </a:fld>
             <a:endParaRPr lang="en-US"/>
           </a:p>
@@ -2065,7 +2071,7 @@
           <a:p>
             <a:fld id="{C03C97F5-7789-BE4C-9397-C1EA5E034617}" type="datetimeFigureOut">
               <a:rPr lang="en-US" smtClean="0"/>
-              <a:t>4/11/21</a:t>
+              <a:t>4/12/21</a:t>
             </a:fld>
             <a:endParaRPr lang="en-US"/>
           </a:p>
@@ -2376,7 +2382,7 @@
           <a:p>
             <a:fld id="{C03C97F5-7789-BE4C-9397-C1EA5E034617}" type="datetimeFigureOut">
               <a:rPr lang="en-US" smtClean="0"/>
-              <a:t>4/11/21</a:t>
+              <a:t>4/12/21</a:t>
             </a:fld>
             <a:endParaRPr lang="en-US"/>
           </a:p>
@@ -2664,7 +2670,7 @@
           <a:p>
             <a:fld id="{C03C97F5-7789-BE4C-9397-C1EA5E034617}" type="datetimeFigureOut">
               <a:rPr lang="en-US" smtClean="0"/>
-              <a:t>4/11/21</a:t>
+              <a:t>4/12/21</a:t>
             </a:fld>
             <a:endParaRPr lang="en-US"/>
           </a:p>
@@ -2905,7 +2911,7 @@
           <a:p>
             <a:fld id="{C03C97F5-7789-BE4C-9397-C1EA5E034617}" type="datetimeFigureOut">
               <a:rPr lang="en-US" smtClean="0"/>
-              <a:t>4/11/21</a:t>
+              <a:t>4/12/21</a:t>
             </a:fld>
             <a:endParaRPr lang="en-US"/>
           </a:p>
@@ -3402,7 +3408,7 @@
         </p:nvSpPr>
         <p:spPr>
           <a:xfrm>
-            <a:off x="838200" y="365125"/>
+            <a:off x="265413" y="344626"/>
             <a:ext cx="10515600" cy="657763"/>
           </a:xfrm>
         </p:spPr>
@@ -3419,10 +3425,2021 @@
           </a:p>
         </p:txBody>
       </p:sp>
+      <p:grpSp>
+        <p:nvGrpSpPr>
+          <p:cNvPr id="80" name="Group 79">
+            <a:extLst>
+              <a:ext uri="{FF2B5EF4-FFF2-40B4-BE49-F238E27FC236}">
+                <a16:creationId xmlns:a16="http://schemas.microsoft.com/office/drawing/2014/main" id="{F97EADC7-A295-7344-8550-9F2B6E98E239}"/>
+              </a:ext>
+            </a:extLst>
+          </p:cNvPr>
+          <p:cNvGrpSpPr/>
+          <p:nvPr/>
+        </p:nvGrpSpPr>
+        <p:grpSpPr>
+          <a:xfrm>
+            <a:off x="5313043" y="5507922"/>
+            <a:ext cx="1970124" cy="699251"/>
+            <a:chOff x="5313043" y="4922411"/>
+            <a:chExt cx="1970124" cy="699251"/>
+          </a:xfrm>
+        </p:grpSpPr>
+        <p:sp>
+          <p:nvSpPr>
+            <p:cNvPr id="68" name="TextBox 67">
+              <a:extLst>
+                <a:ext uri="{FF2B5EF4-FFF2-40B4-BE49-F238E27FC236}">
+                  <a16:creationId xmlns:a16="http://schemas.microsoft.com/office/drawing/2014/main" id="{E3958AA6-6678-6B4C-A686-04BF0F3DADF9}"/>
+                </a:ext>
+              </a:extLst>
+            </p:cNvPr>
+            <p:cNvSpPr txBox="1"/>
+            <p:nvPr/>
+          </p:nvSpPr>
+          <p:spPr>
+            <a:xfrm>
+              <a:off x="5313043" y="4922411"/>
+              <a:ext cx="252000" cy="252000"/>
+            </a:xfrm>
+            <a:prstGeom prst="rect">
+              <a:avLst/>
+            </a:prstGeom>
+            <a:ln/>
+          </p:spPr>
+          <p:style>
+            <a:lnRef idx="2">
+              <a:schemeClr val="accent2">
+                <a:shade val="50000"/>
+              </a:schemeClr>
+            </a:lnRef>
+            <a:fillRef idx="1">
+              <a:schemeClr val="accent2"/>
+            </a:fillRef>
+            <a:effectRef idx="0">
+              <a:schemeClr val="accent2"/>
+            </a:effectRef>
+            <a:fontRef idx="minor">
+              <a:schemeClr val="lt1"/>
+            </a:fontRef>
+          </p:style>
+          <p:txBody>
+            <a:bodyPr wrap="square" lIns="36000" tIns="36000" rIns="36000" bIns="36000" rtlCol="0" anchor="ctr" anchorCtr="0">
+              <a:spAutoFit/>
+            </a:bodyPr>
+            <a:lstStyle/>
+            <a:p>
+              <a:endParaRPr lang="en-US" sz="1100" dirty="0"/>
+            </a:p>
+          </p:txBody>
+        </p:sp>
+        <p:sp>
+          <p:nvSpPr>
+            <p:cNvPr id="69" name="TextBox 68">
+              <a:extLst>
+                <a:ext uri="{FF2B5EF4-FFF2-40B4-BE49-F238E27FC236}">
+                  <a16:creationId xmlns:a16="http://schemas.microsoft.com/office/drawing/2014/main" id="{CB88B25E-11E6-664B-A310-B61B01871540}"/>
+                </a:ext>
+              </a:extLst>
+            </p:cNvPr>
+            <p:cNvSpPr txBox="1"/>
+            <p:nvPr/>
+          </p:nvSpPr>
+          <p:spPr>
+            <a:xfrm>
+              <a:off x="5313043" y="5369521"/>
+              <a:ext cx="252000" cy="252000"/>
+            </a:xfrm>
+            <a:prstGeom prst="rect">
+              <a:avLst/>
+            </a:prstGeom>
+            <a:ln/>
+          </p:spPr>
+          <p:style>
+            <a:lnRef idx="2">
+              <a:schemeClr val="accent6">
+                <a:shade val="50000"/>
+              </a:schemeClr>
+            </a:lnRef>
+            <a:fillRef idx="1">
+              <a:schemeClr val="accent6"/>
+            </a:fillRef>
+            <a:effectRef idx="0">
+              <a:schemeClr val="accent6"/>
+            </a:effectRef>
+            <a:fontRef idx="minor">
+              <a:schemeClr val="lt1"/>
+            </a:fontRef>
+          </p:style>
+          <p:txBody>
+            <a:bodyPr wrap="square" lIns="36000" tIns="36000" rIns="36000" bIns="36000" rtlCol="0" anchor="ctr" anchorCtr="0">
+              <a:spAutoFit/>
+            </a:bodyPr>
+            <a:lstStyle/>
+            <a:p>
+              <a:endParaRPr lang="en-US" sz="1100" dirty="0"/>
+            </a:p>
+          </p:txBody>
+        </p:sp>
+        <p:sp>
+          <p:nvSpPr>
+            <p:cNvPr id="70" name="TextBox 69">
+              <a:extLst>
+                <a:ext uri="{FF2B5EF4-FFF2-40B4-BE49-F238E27FC236}">
+                  <a16:creationId xmlns:a16="http://schemas.microsoft.com/office/drawing/2014/main" id="{ACD246B2-D9F8-9346-8340-442E7F09EE67}"/>
+                </a:ext>
+              </a:extLst>
+            </p:cNvPr>
+            <p:cNvSpPr txBox="1"/>
+            <p:nvPr/>
+          </p:nvSpPr>
+          <p:spPr>
+            <a:xfrm>
+              <a:off x="5713093" y="4927421"/>
+              <a:ext cx="1570074" cy="241980"/>
+            </a:xfrm>
+            <a:prstGeom prst="rect">
+              <a:avLst/>
+            </a:prstGeom>
+            <a:ln/>
+          </p:spPr>
+          <p:style>
+            <a:lnRef idx="2">
+              <a:schemeClr val="dk1"/>
+            </a:lnRef>
+            <a:fillRef idx="1">
+              <a:schemeClr val="lt1"/>
+            </a:fillRef>
+            <a:effectRef idx="0">
+              <a:schemeClr val="dk1"/>
+            </a:effectRef>
+            <a:fontRef idx="minor">
+              <a:schemeClr val="dk1"/>
+            </a:fontRef>
+          </p:style>
+          <p:txBody>
+            <a:bodyPr wrap="square" lIns="36000" tIns="36000" rIns="36000" bIns="36000" rtlCol="0" anchor="ctr" anchorCtr="0">
+              <a:spAutoFit/>
+            </a:bodyPr>
+            <a:lstStyle/>
+            <a:p>
+              <a:r>
+                <a:rPr lang="en-US" sz="1100" dirty="0"/>
+                <a:t>Authentication Elements</a:t>
+              </a:r>
+            </a:p>
+          </p:txBody>
+        </p:sp>
+        <p:sp>
+          <p:nvSpPr>
+            <p:cNvPr id="71" name="TextBox 70">
+              <a:extLst>
+                <a:ext uri="{FF2B5EF4-FFF2-40B4-BE49-F238E27FC236}">
+                  <a16:creationId xmlns:a16="http://schemas.microsoft.com/office/drawing/2014/main" id="{65643C07-E79A-0C4E-A555-A82E906BA92A}"/>
+                </a:ext>
+              </a:extLst>
+            </p:cNvPr>
+            <p:cNvSpPr txBox="1"/>
+            <p:nvPr/>
+          </p:nvSpPr>
+          <p:spPr>
+            <a:xfrm>
+              <a:off x="5713093" y="5379682"/>
+              <a:ext cx="1570074" cy="241980"/>
+            </a:xfrm>
+            <a:prstGeom prst="rect">
+              <a:avLst/>
+            </a:prstGeom>
+            <a:ln/>
+          </p:spPr>
+          <p:style>
+            <a:lnRef idx="2">
+              <a:schemeClr val="dk1"/>
+            </a:lnRef>
+            <a:fillRef idx="1">
+              <a:schemeClr val="lt1"/>
+            </a:fillRef>
+            <a:effectRef idx="0">
+              <a:schemeClr val="dk1"/>
+            </a:effectRef>
+            <a:fontRef idx="minor">
+              <a:schemeClr val="dk1"/>
+            </a:fontRef>
+          </p:style>
+          <p:txBody>
+            <a:bodyPr wrap="square" lIns="36000" tIns="36000" rIns="36000" bIns="36000" rtlCol="0" anchor="ctr" anchorCtr="0">
+              <a:spAutoFit/>
+            </a:bodyPr>
+            <a:lstStyle/>
+            <a:p>
+              <a:r>
+                <a:rPr lang="en-US" sz="1100" dirty="0"/>
+                <a:t>Frequent Changing Data</a:t>
+              </a:r>
+            </a:p>
+          </p:txBody>
+        </p:sp>
+      </p:grpSp>
+      <p:sp>
+        <p:nvSpPr>
+          <p:cNvPr id="4" name="TextBox 3">
+            <a:extLst>
+              <a:ext uri="{FF2B5EF4-FFF2-40B4-BE49-F238E27FC236}">
+                <a16:creationId xmlns:a16="http://schemas.microsoft.com/office/drawing/2014/main" id="{2E0564D0-FB10-5B46-A481-1719B1ACF581}"/>
+              </a:ext>
+            </a:extLst>
+          </p:cNvPr>
+          <p:cNvSpPr txBox="1"/>
+          <p:nvPr/>
+        </p:nvSpPr>
+        <p:spPr>
+          <a:xfrm>
+            <a:off x="265413" y="1930045"/>
+            <a:ext cx="1468876" cy="241980"/>
+          </a:xfrm>
+          <a:prstGeom prst="rect">
+            <a:avLst/>
+          </a:prstGeom>
+          <a:ln/>
+        </p:spPr>
+        <p:style>
+          <a:lnRef idx="2">
+            <a:schemeClr val="dk1"/>
+          </a:lnRef>
+          <a:fillRef idx="1">
+            <a:schemeClr val="lt1"/>
+          </a:fillRef>
+          <a:effectRef idx="0">
+            <a:schemeClr val="dk1"/>
+          </a:effectRef>
+          <a:fontRef idx="minor">
+            <a:schemeClr val="dk1"/>
+          </a:fontRef>
+        </p:style>
+        <p:txBody>
+          <a:bodyPr wrap="square" lIns="36000" tIns="36000" rIns="36000" bIns="36000" rtlCol="0" anchor="ctr" anchorCtr="0">
+            <a:spAutoFit/>
+          </a:bodyPr>
+          <a:lstStyle/>
+          <a:p>
+            <a:r>
+              <a:rPr lang="en-US" sz="1100" b="1" dirty="0"/>
+              <a:t>_id (user_id) | STRING</a:t>
+            </a:r>
+          </a:p>
+        </p:txBody>
+      </p:sp>
+      <p:sp>
+        <p:nvSpPr>
+          <p:cNvPr id="5" name="TextBox 4">
+            <a:extLst>
+              <a:ext uri="{FF2B5EF4-FFF2-40B4-BE49-F238E27FC236}">
+                <a16:creationId xmlns:a16="http://schemas.microsoft.com/office/drawing/2014/main" id="{815A05F7-3294-2B49-A810-D95332224140}"/>
+              </a:ext>
+            </a:extLst>
+          </p:cNvPr>
+          <p:cNvSpPr txBox="1"/>
+          <p:nvPr/>
+        </p:nvSpPr>
+        <p:spPr>
+          <a:xfrm>
+            <a:off x="265414" y="2214095"/>
+            <a:ext cx="1580002" cy="241980"/>
+          </a:xfrm>
+          <a:prstGeom prst="rect">
+            <a:avLst/>
+          </a:prstGeom>
+          <a:ln w="6350"/>
+        </p:spPr>
+        <p:style>
+          <a:lnRef idx="2">
+            <a:schemeClr val="dk1"/>
+          </a:lnRef>
+          <a:fillRef idx="1">
+            <a:schemeClr val="lt1"/>
+          </a:fillRef>
+          <a:effectRef idx="0">
+            <a:schemeClr val="dk1"/>
+          </a:effectRef>
+          <a:fontRef idx="minor">
+            <a:schemeClr val="dk1"/>
+          </a:fontRef>
+        </p:style>
+        <p:txBody>
+          <a:bodyPr wrap="square" lIns="36000" tIns="36000" rIns="36000" bIns="36000" rtlCol="0" anchor="ctr" anchorCtr="0">
+            <a:spAutoFit/>
+          </a:bodyPr>
+          <a:lstStyle/>
+          <a:p>
+            <a:r>
+              <a:rPr lang="en-US" sz="1100" dirty="0"/>
+              <a:t>user_first_name | STRING</a:t>
+            </a:r>
+          </a:p>
+        </p:txBody>
+      </p:sp>
+      <p:sp>
+        <p:nvSpPr>
+          <p:cNvPr id="6" name="TextBox 5">
+            <a:extLst>
+              <a:ext uri="{FF2B5EF4-FFF2-40B4-BE49-F238E27FC236}">
+                <a16:creationId xmlns:a16="http://schemas.microsoft.com/office/drawing/2014/main" id="{B9CE23F2-5F19-274E-8FA9-D1EC9599B281}"/>
+              </a:ext>
+            </a:extLst>
+          </p:cNvPr>
+          <p:cNvSpPr txBox="1"/>
+          <p:nvPr/>
+        </p:nvSpPr>
+        <p:spPr>
+          <a:xfrm>
+            <a:off x="265414" y="2498145"/>
+            <a:ext cx="1580002" cy="241980"/>
+          </a:xfrm>
+          <a:prstGeom prst="rect">
+            <a:avLst/>
+          </a:prstGeom>
+          <a:ln w="6350"/>
+        </p:spPr>
+        <p:style>
+          <a:lnRef idx="2">
+            <a:schemeClr val="dk1"/>
+          </a:lnRef>
+          <a:fillRef idx="1">
+            <a:schemeClr val="lt1"/>
+          </a:fillRef>
+          <a:effectRef idx="0">
+            <a:schemeClr val="dk1"/>
+          </a:effectRef>
+          <a:fontRef idx="minor">
+            <a:schemeClr val="dk1"/>
+          </a:fontRef>
+        </p:style>
+        <p:txBody>
+          <a:bodyPr wrap="square" lIns="36000" tIns="36000" rIns="36000" bIns="36000" rtlCol="0" anchor="ctr" anchorCtr="0">
+            <a:spAutoFit/>
+          </a:bodyPr>
+          <a:lstStyle/>
+          <a:p>
+            <a:r>
+              <a:rPr lang="en-US" sz="1100" dirty="0"/>
+              <a:t>user_last_name | STRING</a:t>
+            </a:r>
+          </a:p>
+        </p:txBody>
+      </p:sp>
+      <p:sp>
+        <p:nvSpPr>
+          <p:cNvPr id="7" name="TextBox 6">
+            <a:extLst>
+              <a:ext uri="{FF2B5EF4-FFF2-40B4-BE49-F238E27FC236}">
+                <a16:creationId xmlns:a16="http://schemas.microsoft.com/office/drawing/2014/main" id="{00D7268A-16E4-3A48-A7C2-F321E5ACEE33}"/>
+              </a:ext>
+            </a:extLst>
+          </p:cNvPr>
+          <p:cNvSpPr txBox="1"/>
+          <p:nvPr/>
+        </p:nvSpPr>
+        <p:spPr>
+          <a:xfrm>
+            <a:off x="265413" y="2782195"/>
+            <a:ext cx="2097359" cy="241980"/>
+          </a:xfrm>
+          <a:prstGeom prst="rect">
+            <a:avLst/>
+          </a:prstGeom>
+          <a:ln/>
+        </p:spPr>
+        <p:style>
+          <a:lnRef idx="2">
+            <a:schemeClr val="accent2">
+              <a:shade val="50000"/>
+            </a:schemeClr>
+          </a:lnRef>
+          <a:fillRef idx="1">
+            <a:schemeClr val="accent2"/>
+          </a:fillRef>
+          <a:effectRef idx="0">
+            <a:schemeClr val="accent2"/>
+          </a:effectRef>
+          <a:fontRef idx="minor">
+            <a:schemeClr val="lt1"/>
+          </a:fontRef>
+        </p:style>
+        <p:txBody>
+          <a:bodyPr wrap="square" lIns="36000" tIns="36000" rIns="36000" bIns="36000" rtlCol="0" anchor="ctr" anchorCtr="0">
+            <a:spAutoFit/>
+          </a:bodyPr>
+          <a:lstStyle/>
+          <a:p>
+            <a:r>
+              <a:rPr lang="en-US" sz="1100" dirty="0"/>
+              <a:t>user_email_id | STRING (UNIQUE)</a:t>
+            </a:r>
+          </a:p>
+        </p:txBody>
+      </p:sp>
+      <p:sp>
+        <p:nvSpPr>
+          <p:cNvPr id="8" name="TextBox 7">
+            <a:extLst>
+              <a:ext uri="{FF2B5EF4-FFF2-40B4-BE49-F238E27FC236}">
+                <a16:creationId xmlns:a16="http://schemas.microsoft.com/office/drawing/2014/main" id="{98D2BA6C-177B-444A-BF90-D852527A6B24}"/>
+              </a:ext>
+            </a:extLst>
+          </p:cNvPr>
+          <p:cNvSpPr txBox="1"/>
+          <p:nvPr/>
+        </p:nvSpPr>
+        <p:spPr>
+          <a:xfrm>
+            <a:off x="265413" y="3066245"/>
+            <a:ext cx="2097360" cy="241980"/>
+          </a:xfrm>
+          <a:prstGeom prst="rect">
+            <a:avLst/>
+          </a:prstGeom>
+          <a:ln/>
+        </p:spPr>
+        <p:style>
+          <a:lnRef idx="2">
+            <a:schemeClr val="accent2">
+              <a:shade val="50000"/>
+            </a:schemeClr>
+          </a:lnRef>
+          <a:fillRef idx="1">
+            <a:schemeClr val="accent2"/>
+          </a:fillRef>
+          <a:effectRef idx="0">
+            <a:schemeClr val="accent2"/>
+          </a:effectRef>
+          <a:fontRef idx="minor">
+            <a:schemeClr val="lt1"/>
+          </a:fontRef>
+        </p:style>
+        <p:txBody>
+          <a:bodyPr wrap="square" lIns="36000" tIns="36000" rIns="36000" bIns="36000" rtlCol="0" anchor="ctr" anchorCtr="0">
+            <a:spAutoFit/>
+          </a:bodyPr>
+          <a:lstStyle/>
+          <a:p>
+            <a:r>
+              <a:rPr lang="en-US" sz="1100" dirty="0"/>
+              <a:t>user_password_hash | STRING</a:t>
+            </a:r>
+          </a:p>
+        </p:txBody>
+      </p:sp>
+      <p:sp>
+        <p:nvSpPr>
+          <p:cNvPr id="9" name="TextBox 8">
+            <a:extLst>
+              <a:ext uri="{FF2B5EF4-FFF2-40B4-BE49-F238E27FC236}">
+                <a16:creationId xmlns:a16="http://schemas.microsoft.com/office/drawing/2014/main" id="{248D9C6F-BF69-EF43-9983-C698265B2546}"/>
+              </a:ext>
+            </a:extLst>
+          </p:cNvPr>
+          <p:cNvSpPr txBox="1"/>
+          <p:nvPr/>
+        </p:nvSpPr>
+        <p:spPr>
+          <a:xfrm>
+            <a:off x="265413" y="3350295"/>
+            <a:ext cx="2097360" cy="241980"/>
+          </a:xfrm>
+          <a:prstGeom prst="rect">
+            <a:avLst/>
+          </a:prstGeom>
+          <a:ln/>
+        </p:spPr>
+        <p:style>
+          <a:lnRef idx="2">
+            <a:schemeClr val="accent2">
+              <a:shade val="50000"/>
+            </a:schemeClr>
+          </a:lnRef>
+          <a:fillRef idx="1">
+            <a:schemeClr val="accent2"/>
+          </a:fillRef>
+          <a:effectRef idx="0">
+            <a:schemeClr val="accent2"/>
+          </a:effectRef>
+          <a:fontRef idx="minor">
+            <a:schemeClr val="lt1"/>
+          </a:fontRef>
+        </p:style>
+        <p:txBody>
+          <a:bodyPr wrap="square" lIns="36000" tIns="36000" rIns="36000" bIns="36000" rtlCol="0" anchor="ctr" anchorCtr="0">
+            <a:spAutoFit/>
+          </a:bodyPr>
+          <a:lstStyle/>
+          <a:p>
+            <a:r>
+              <a:rPr lang="en-US" sz="1100" dirty="0"/>
+              <a:t>user_is_verified | BOOLEAN</a:t>
+            </a:r>
+          </a:p>
+        </p:txBody>
+      </p:sp>
+      <p:sp>
+        <p:nvSpPr>
+          <p:cNvPr id="10" name="TextBox 9">
+            <a:extLst>
+              <a:ext uri="{FF2B5EF4-FFF2-40B4-BE49-F238E27FC236}">
+                <a16:creationId xmlns:a16="http://schemas.microsoft.com/office/drawing/2014/main" id="{04F37F93-4C54-1A48-86CE-47F2A073DBC8}"/>
+              </a:ext>
+            </a:extLst>
+          </p:cNvPr>
+          <p:cNvSpPr txBox="1"/>
+          <p:nvPr/>
+        </p:nvSpPr>
+        <p:spPr>
+          <a:xfrm>
+            <a:off x="265413" y="3634345"/>
+            <a:ext cx="2097360" cy="241980"/>
+          </a:xfrm>
+          <a:prstGeom prst="rect">
+            <a:avLst/>
+          </a:prstGeom>
+          <a:ln/>
+        </p:spPr>
+        <p:style>
+          <a:lnRef idx="2">
+            <a:schemeClr val="accent2">
+              <a:shade val="50000"/>
+            </a:schemeClr>
+          </a:lnRef>
+          <a:fillRef idx="1">
+            <a:schemeClr val="accent2"/>
+          </a:fillRef>
+          <a:effectRef idx="0">
+            <a:schemeClr val="accent2"/>
+          </a:effectRef>
+          <a:fontRef idx="minor">
+            <a:schemeClr val="lt1"/>
+          </a:fontRef>
+        </p:style>
+        <p:txBody>
+          <a:bodyPr wrap="square" lIns="36000" tIns="36000" rIns="36000" bIns="36000" rtlCol="0" anchor="ctr" anchorCtr="0">
+            <a:spAutoFit/>
+          </a:bodyPr>
+          <a:lstStyle/>
+          <a:p>
+            <a:r>
+              <a:rPr lang="en-US" sz="1100" dirty="0"/>
+              <a:t>last_password_reset | TIMESTAMP</a:t>
+            </a:r>
+          </a:p>
+        </p:txBody>
+      </p:sp>
+      <p:sp>
+        <p:nvSpPr>
+          <p:cNvPr id="72" name="TextBox 71">
+            <a:extLst>
+              <a:ext uri="{FF2B5EF4-FFF2-40B4-BE49-F238E27FC236}">
+                <a16:creationId xmlns:a16="http://schemas.microsoft.com/office/drawing/2014/main" id="{CB2D2DDB-072F-AF45-AAC8-F5B31A4E246F}"/>
+              </a:ext>
+            </a:extLst>
+          </p:cNvPr>
+          <p:cNvSpPr txBox="1"/>
+          <p:nvPr/>
+        </p:nvSpPr>
+        <p:spPr>
+          <a:xfrm>
+            <a:off x="265413" y="1490254"/>
+            <a:ext cx="1650936" cy="288147"/>
+          </a:xfrm>
+          <a:prstGeom prst="rect">
+            <a:avLst/>
+          </a:prstGeom>
+          <a:ln>
+            <a:noFill/>
+          </a:ln>
+        </p:spPr>
+        <p:style>
+          <a:lnRef idx="2">
+            <a:schemeClr val="dk1"/>
+          </a:lnRef>
+          <a:fillRef idx="1">
+            <a:schemeClr val="lt1"/>
+          </a:fillRef>
+          <a:effectRef idx="0">
+            <a:schemeClr val="dk1"/>
+          </a:effectRef>
+          <a:fontRef idx="minor">
+            <a:schemeClr val="dk1"/>
+          </a:fontRef>
+        </p:style>
+        <p:txBody>
+          <a:bodyPr wrap="square" lIns="36000" tIns="36000" rIns="36000" bIns="36000" rtlCol="0" anchor="ctr" anchorCtr="0">
+            <a:spAutoFit/>
+          </a:bodyPr>
+          <a:lstStyle/>
+          <a:p>
+            <a:r>
+              <a:rPr lang="en-US" sz="1400" b="1" dirty="0" err="1"/>
+              <a:t>UserAuthCredentials</a:t>
+            </a:r>
+            <a:endParaRPr lang="en-US" sz="1400" b="1" dirty="0"/>
+          </a:p>
+        </p:txBody>
+      </p:sp>
+      <p:grpSp>
+        <p:nvGrpSpPr>
+          <p:cNvPr id="77" name="Group 76">
+            <a:extLst>
+              <a:ext uri="{FF2B5EF4-FFF2-40B4-BE49-F238E27FC236}">
+                <a16:creationId xmlns:a16="http://schemas.microsoft.com/office/drawing/2014/main" id="{F7245F58-A82C-5845-9178-2CC7F16BE0EB}"/>
+              </a:ext>
+            </a:extLst>
+          </p:cNvPr>
+          <p:cNvGrpSpPr/>
+          <p:nvPr/>
+        </p:nvGrpSpPr>
+        <p:grpSpPr>
+          <a:xfrm>
+            <a:off x="2858036" y="1490253"/>
+            <a:ext cx="2531087" cy="3123449"/>
+            <a:chOff x="2858036" y="1490253"/>
+            <a:chExt cx="2531087" cy="3123449"/>
+          </a:xfrm>
+        </p:grpSpPr>
+        <p:sp>
+          <p:nvSpPr>
+            <p:cNvPr id="11" name="TextBox 10">
+              <a:extLst>
+                <a:ext uri="{FF2B5EF4-FFF2-40B4-BE49-F238E27FC236}">
+                  <a16:creationId xmlns:a16="http://schemas.microsoft.com/office/drawing/2014/main" id="{35FD4316-CF5C-2D48-9A22-3FDA948A9D33}"/>
+                </a:ext>
+              </a:extLst>
+            </p:cNvPr>
+            <p:cNvSpPr txBox="1"/>
+            <p:nvPr/>
+          </p:nvSpPr>
+          <p:spPr>
+            <a:xfrm>
+              <a:off x="2858038" y="1930045"/>
+              <a:ext cx="1468876" cy="241980"/>
+            </a:xfrm>
+            <a:prstGeom prst="rect">
+              <a:avLst/>
+            </a:prstGeom>
+            <a:ln/>
+          </p:spPr>
+          <p:style>
+            <a:lnRef idx="2">
+              <a:schemeClr val="dk1"/>
+            </a:lnRef>
+            <a:fillRef idx="1">
+              <a:schemeClr val="lt1"/>
+            </a:fillRef>
+            <a:effectRef idx="0">
+              <a:schemeClr val="dk1"/>
+            </a:effectRef>
+            <a:fontRef idx="minor">
+              <a:schemeClr val="dk1"/>
+            </a:fontRef>
+          </p:style>
+          <p:txBody>
+            <a:bodyPr wrap="square" lIns="36000" tIns="36000" rIns="36000" bIns="36000" rtlCol="0" anchor="ctr" anchorCtr="0">
+              <a:spAutoFit/>
+            </a:bodyPr>
+            <a:lstStyle/>
+            <a:p>
+              <a:r>
+                <a:rPr lang="en-US" sz="1100" b="1" dirty="0"/>
+                <a:t>_id (user_id) | STRING</a:t>
+              </a:r>
+            </a:p>
+          </p:txBody>
+        </p:sp>
+        <p:sp>
+          <p:nvSpPr>
+            <p:cNvPr id="12" name="TextBox 11">
+              <a:extLst>
+                <a:ext uri="{FF2B5EF4-FFF2-40B4-BE49-F238E27FC236}">
+                  <a16:creationId xmlns:a16="http://schemas.microsoft.com/office/drawing/2014/main" id="{EF1449F8-A21A-404E-AA31-5C5868BB1DA4}"/>
+                </a:ext>
+              </a:extLst>
+            </p:cNvPr>
+            <p:cNvSpPr txBox="1"/>
+            <p:nvPr/>
+          </p:nvSpPr>
+          <p:spPr>
+            <a:xfrm>
+              <a:off x="2858039" y="2214095"/>
+              <a:ext cx="1580002" cy="241980"/>
+            </a:xfrm>
+            <a:prstGeom prst="rect">
+              <a:avLst/>
+            </a:prstGeom>
+            <a:ln w="6350"/>
+          </p:spPr>
+          <p:style>
+            <a:lnRef idx="2">
+              <a:schemeClr val="dk1"/>
+            </a:lnRef>
+            <a:fillRef idx="1">
+              <a:schemeClr val="lt1"/>
+            </a:fillRef>
+            <a:effectRef idx="0">
+              <a:schemeClr val="dk1"/>
+            </a:effectRef>
+            <a:fontRef idx="minor">
+              <a:schemeClr val="dk1"/>
+            </a:fontRef>
+          </p:style>
+          <p:txBody>
+            <a:bodyPr wrap="square" lIns="36000" tIns="36000" rIns="36000" bIns="36000" rtlCol="0" anchor="ctr" anchorCtr="0">
+              <a:spAutoFit/>
+            </a:bodyPr>
+            <a:lstStyle/>
+            <a:p>
+              <a:r>
+                <a:rPr lang="en-US" sz="1100" dirty="0"/>
+                <a:t>user_first_name | STRING</a:t>
+              </a:r>
+            </a:p>
+          </p:txBody>
+        </p:sp>
+        <p:sp>
+          <p:nvSpPr>
+            <p:cNvPr id="13" name="TextBox 12">
+              <a:extLst>
+                <a:ext uri="{FF2B5EF4-FFF2-40B4-BE49-F238E27FC236}">
+                  <a16:creationId xmlns:a16="http://schemas.microsoft.com/office/drawing/2014/main" id="{D3A4117D-62D5-624C-9518-26F86AF335E8}"/>
+                </a:ext>
+              </a:extLst>
+            </p:cNvPr>
+            <p:cNvSpPr txBox="1"/>
+            <p:nvPr/>
+          </p:nvSpPr>
+          <p:spPr>
+            <a:xfrm>
+              <a:off x="2858039" y="2498145"/>
+              <a:ext cx="1580002" cy="241980"/>
+            </a:xfrm>
+            <a:prstGeom prst="rect">
+              <a:avLst/>
+            </a:prstGeom>
+            <a:ln w="6350"/>
+          </p:spPr>
+          <p:style>
+            <a:lnRef idx="2">
+              <a:schemeClr val="dk1"/>
+            </a:lnRef>
+            <a:fillRef idx="1">
+              <a:schemeClr val="lt1"/>
+            </a:fillRef>
+            <a:effectRef idx="0">
+              <a:schemeClr val="dk1"/>
+            </a:effectRef>
+            <a:fontRef idx="minor">
+              <a:schemeClr val="dk1"/>
+            </a:fontRef>
+          </p:style>
+          <p:txBody>
+            <a:bodyPr wrap="square" lIns="36000" tIns="36000" rIns="36000" bIns="36000" rtlCol="0" anchor="ctr" anchorCtr="0">
+              <a:spAutoFit/>
+            </a:bodyPr>
+            <a:lstStyle/>
+            <a:p>
+              <a:r>
+                <a:rPr lang="en-US" sz="1100" dirty="0"/>
+                <a:t>user_last_name | STRING</a:t>
+              </a:r>
+            </a:p>
+          </p:txBody>
+        </p:sp>
+        <p:sp>
+          <p:nvSpPr>
+            <p:cNvPr id="14" name="TextBox 13">
+              <a:extLst>
+                <a:ext uri="{FF2B5EF4-FFF2-40B4-BE49-F238E27FC236}">
+                  <a16:creationId xmlns:a16="http://schemas.microsoft.com/office/drawing/2014/main" id="{69F5555E-D64D-0D42-9684-ECF37B1DA1D1}"/>
+                </a:ext>
+              </a:extLst>
+            </p:cNvPr>
+            <p:cNvSpPr txBox="1"/>
+            <p:nvPr/>
+          </p:nvSpPr>
+          <p:spPr>
+            <a:xfrm>
+              <a:off x="2858038" y="2782195"/>
+              <a:ext cx="2460987" cy="241980"/>
+            </a:xfrm>
+            <a:prstGeom prst="rect">
+              <a:avLst/>
+            </a:prstGeom>
+            <a:ln/>
+          </p:spPr>
+          <p:style>
+            <a:lnRef idx="2">
+              <a:schemeClr val="accent6">
+                <a:shade val="50000"/>
+              </a:schemeClr>
+            </a:lnRef>
+            <a:fillRef idx="1">
+              <a:schemeClr val="accent6"/>
+            </a:fillRef>
+            <a:effectRef idx="0">
+              <a:schemeClr val="accent6"/>
+            </a:effectRef>
+            <a:fontRef idx="minor">
+              <a:schemeClr val="lt1"/>
+            </a:fontRef>
+          </p:style>
+          <p:txBody>
+            <a:bodyPr wrap="square" lIns="36000" tIns="36000" rIns="36000" bIns="36000" rtlCol="0" anchor="ctr" anchorCtr="0">
+              <a:spAutoFit/>
+            </a:bodyPr>
+            <a:lstStyle/>
+            <a:p>
+              <a:r>
+                <a:rPr lang="en-US" sz="1100" dirty="0"/>
+                <a:t>current_status | STRING (Online/Offline)</a:t>
+              </a:r>
+            </a:p>
+          </p:txBody>
+        </p:sp>
+        <p:sp>
+          <p:nvSpPr>
+            <p:cNvPr id="15" name="TextBox 14">
+              <a:extLst>
+                <a:ext uri="{FF2B5EF4-FFF2-40B4-BE49-F238E27FC236}">
+                  <a16:creationId xmlns:a16="http://schemas.microsoft.com/office/drawing/2014/main" id="{F876F67B-5104-9E43-BC53-7F85421F2AFE}"/>
+                </a:ext>
+              </a:extLst>
+            </p:cNvPr>
+            <p:cNvSpPr txBox="1"/>
+            <p:nvPr/>
+          </p:nvSpPr>
+          <p:spPr>
+            <a:xfrm>
+              <a:off x="2858038" y="3066245"/>
+              <a:ext cx="1879332" cy="241980"/>
+            </a:xfrm>
+            <a:prstGeom prst="rect">
+              <a:avLst/>
+            </a:prstGeom>
+            <a:ln/>
+          </p:spPr>
+          <p:style>
+            <a:lnRef idx="2">
+              <a:schemeClr val="accent6">
+                <a:shade val="50000"/>
+              </a:schemeClr>
+            </a:lnRef>
+            <a:fillRef idx="1">
+              <a:schemeClr val="accent6"/>
+            </a:fillRef>
+            <a:effectRef idx="0">
+              <a:schemeClr val="accent6"/>
+            </a:effectRef>
+            <a:fontRef idx="minor">
+              <a:schemeClr val="lt1"/>
+            </a:fontRef>
+          </p:style>
+          <p:txBody>
+            <a:bodyPr wrap="square" lIns="36000" tIns="36000" rIns="36000" bIns="36000" rtlCol="0" anchor="ctr" anchorCtr="0">
+              <a:spAutoFit/>
+            </a:bodyPr>
+            <a:lstStyle/>
+            <a:p>
+              <a:r>
+                <a:rPr lang="en-US" sz="1100" dirty="0" err="1"/>
+                <a:t>last_login_time</a:t>
+              </a:r>
+              <a:r>
+                <a:rPr lang="en-US" sz="1100" dirty="0"/>
+                <a:t> | TIMESTAMP</a:t>
+              </a:r>
+            </a:p>
+          </p:txBody>
+        </p:sp>
+        <p:sp>
+          <p:nvSpPr>
+            <p:cNvPr id="16" name="TextBox 15">
+              <a:extLst>
+                <a:ext uri="{FF2B5EF4-FFF2-40B4-BE49-F238E27FC236}">
+                  <a16:creationId xmlns:a16="http://schemas.microsoft.com/office/drawing/2014/main" id="{A81113C2-A10C-9A4F-AC4D-1063FDC2D4C3}"/>
+                </a:ext>
+              </a:extLst>
+            </p:cNvPr>
+            <p:cNvSpPr txBox="1"/>
+            <p:nvPr/>
+          </p:nvSpPr>
+          <p:spPr>
+            <a:xfrm>
+              <a:off x="2858037" y="3350295"/>
+              <a:ext cx="1879333" cy="241980"/>
+            </a:xfrm>
+            <a:prstGeom prst="rect">
+              <a:avLst/>
+            </a:prstGeom>
+            <a:ln/>
+          </p:spPr>
+          <p:style>
+            <a:lnRef idx="2">
+              <a:schemeClr val="accent6">
+                <a:shade val="50000"/>
+              </a:schemeClr>
+            </a:lnRef>
+            <a:fillRef idx="1">
+              <a:schemeClr val="accent6"/>
+            </a:fillRef>
+            <a:effectRef idx="0">
+              <a:schemeClr val="accent6"/>
+            </a:effectRef>
+            <a:fontRef idx="minor">
+              <a:schemeClr val="lt1"/>
+            </a:fontRef>
+          </p:style>
+          <p:txBody>
+            <a:bodyPr wrap="square" lIns="36000" tIns="36000" rIns="36000" bIns="36000" rtlCol="0" anchor="ctr" anchorCtr="0">
+              <a:spAutoFit/>
+            </a:bodyPr>
+            <a:lstStyle/>
+            <a:p>
+              <a:r>
+                <a:rPr lang="en-US" sz="1100" dirty="0" err="1"/>
+                <a:t>last_logout_time</a:t>
+              </a:r>
+              <a:r>
+                <a:rPr lang="en-US" sz="1100" dirty="0"/>
+                <a:t> | TIMESTAMP</a:t>
+              </a:r>
+            </a:p>
+          </p:txBody>
+        </p:sp>
+        <p:sp>
+          <p:nvSpPr>
+            <p:cNvPr id="17" name="TextBox 16">
+              <a:extLst>
+                <a:ext uri="{FF2B5EF4-FFF2-40B4-BE49-F238E27FC236}">
+                  <a16:creationId xmlns:a16="http://schemas.microsoft.com/office/drawing/2014/main" id="{B53BB30D-62C7-C04E-97F0-05CE8D15546A}"/>
+                </a:ext>
+              </a:extLst>
+            </p:cNvPr>
+            <p:cNvSpPr txBox="1"/>
+            <p:nvPr/>
+          </p:nvSpPr>
+          <p:spPr>
+            <a:xfrm>
+              <a:off x="2858037" y="3634345"/>
+              <a:ext cx="2531086" cy="241980"/>
+            </a:xfrm>
+            <a:prstGeom prst="rect">
+              <a:avLst/>
+            </a:prstGeom>
+            <a:ln w="6350"/>
+          </p:spPr>
+          <p:style>
+            <a:lnRef idx="2">
+              <a:schemeClr val="dk1"/>
+            </a:lnRef>
+            <a:fillRef idx="1">
+              <a:schemeClr val="lt1"/>
+            </a:fillRef>
+            <a:effectRef idx="0">
+              <a:schemeClr val="dk1"/>
+            </a:effectRef>
+            <a:fontRef idx="minor">
+              <a:schemeClr val="dk1"/>
+            </a:fontRef>
+          </p:style>
+          <p:txBody>
+            <a:bodyPr wrap="square" lIns="36000" tIns="36000" rIns="36000" bIns="36000" rtlCol="0" anchor="ctr" anchorCtr="0">
+              <a:spAutoFit/>
+            </a:bodyPr>
+            <a:lstStyle/>
+            <a:p>
+              <a:r>
+                <a:rPr lang="en-US" sz="1100" dirty="0" err="1"/>
+                <a:t>user_groups_list</a:t>
+              </a:r>
+              <a:r>
+                <a:rPr lang="en-US" sz="1100" dirty="0"/>
+                <a:t> | Array of </a:t>
+              </a:r>
+              <a:r>
+                <a:rPr lang="en-US" sz="1100" dirty="0" err="1"/>
+                <a:t>ChatGroup</a:t>
+              </a:r>
+              <a:r>
+                <a:rPr lang="en-US" sz="1100" dirty="0"/>
+                <a:t>(_id)</a:t>
+              </a:r>
+            </a:p>
+          </p:txBody>
+        </p:sp>
+        <p:sp>
+          <p:nvSpPr>
+            <p:cNvPr id="18" name="TextBox 17">
+              <a:extLst>
+                <a:ext uri="{FF2B5EF4-FFF2-40B4-BE49-F238E27FC236}">
+                  <a16:creationId xmlns:a16="http://schemas.microsoft.com/office/drawing/2014/main" id="{25A6F8BE-600F-A14E-8624-454A8A12FB7D}"/>
+                </a:ext>
+              </a:extLst>
+            </p:cNvPr>
+            <p:cNvSpPr txBox="1"/>
+            <p:nvPr/>
+          </p:nvSpPr>
+          <p:spPr>
+            <a:xfrm>
+              <a:off x="2858037" y="3918395"/>
+              <a:ext cx="2531086" cy="241980"/>
+            </a:xfrm>
+            <a:prstGeom prst="rect">
+              <a:avLst/>
+            </a:prstGeom>
+            <a:ln w="6350"/>
+          </p:spPr>
+          <p:style>
+            <a:lnRef idx="2">
+              <a:schemeClr val="dk1"/>
+            </a:lnRef>
+            <a:fillRef idx="1">
+              <a:schemeClr val="lt1"/>
+            </a:fillRef>
+            <a:effectRef idx="0">
+              <a:schemeClr val="dk1"/>
+            </a:effectRef>
+            <a:fontRef idx="minor">
+              <a:schemeClr val="dk1"/>
+            </a:fontRef>
+          </p:style>
+          <p:txBody>
+            <a:bodyPr wrap="square" lIns="36000" tIns="36000" rIns="36000" bIns="36000" rtlCol="0" anchor="ctr" anchorCtr="0">
+              <a:spAutoFit/>
+            </a:bodyPr>
+            <a:lstStyle/>
+            <a:p>
+              <a:r>
+                <a:rPr lang="en-US" sz="1100" dirty="0" err="1"/>
+                <a:t>user_friends_list</a:t>
+              </a:r>
+              <a:r>
+                <a:rPr lang="en-US" sz="1100" dirty="0"/>
+                <a:t> | Array of </a:t>
+              </a:r>
+              <a:r>
+                <a:rPr lang="en-US" sz="1100" dirty="0" err="1"/>
+                <a:t>ChatUser</a:t>
+              </a:r>
+              <a:r>
+                <a:rPr lang="en-US" sz="1100" dirty="0"/>
+                <a:t>(_id)</a:t>
+              </a:r>
+            </a:p>
+          </p:txBody>
+        </p:sp>
+        <p:sp>
+          <p:nvSpPr>
+            <p:cNvPr id="19" name="TextBox 18">
+              <a:extLst>
+                <a:ext uri="{FF2B5EF4-FFF2-40B4-BE49-F238E27FC236}">
+                  <a16:creationId xmlns:a16="http://schemas.microsoft.com/office/drawing/2014/main" id="{1023779E-10C5-EF46-8AEC-34CD0F0FD8E5}"/>
+                </a:ext>
+              </a:extLst>
+            </p:cNvPr>
+            <p:cNvSpPr txBox="1"/>
+            <p:nvPr/>
+          </p:nvSpPr>
+          <p:spPr>
+            <a:xfrm>
+              <a:off x="2858036" y="4202445"/>
+              <a:ext cx="2531087" cy="411257"/>
+            </a:xfrm>
+            <a:prstGeom prst="rect">
+              <a:avLst/>
+            </a:prstGeom>
+            <a:ln w="6350"/>
+          </p:spPr>
+          <p:style>
+            <a:lnRef idx="2">
+              <a:schemeClr val="dk1"/>
+            </a:lnRef>
+            <a:fillRef idx="1">
+              <a:schemeClr val="lt1"/>
+            </a:fillRef>
+            <a:effectRef idx="0">
+              <a:schemeClr val="dk1"/>
+            </a:effectRef>
+            <a:fontRef idx="minor">
+              <a:schemeClr val="dk1"/>
+            </a:fontRef>
+          </p:style>
+          <p:txBody>
+            <a:bodyPr wrap="square" lIns="36000" tIns="36000" rIns="36000" bIns="36000" rtlCol="0" anchor="ctr" anchorCtr="0">
+              <a:spAutoFit/>
+            </a:bodyPr>
+            <a:lstStyle/>
+            <a:p>
+              <a:r>
+                <a:rPr lang="en-US" sz="1100" dirty="0" err="1"/>
+                <a:t>user_friends_chat_map</a:t>
+              </a:r>
+              <a:r>
+                <a:rPr lang="en-US" sz="1100" dirty="0"/>
+                <a:t> | Array of Map(</a:t>
+              </a:r>
+              <a:r>
+                <a:rPr lang="en-US" sz="1100" dirty="0" err="1"/>
+                <a:t>ChatUser</a:t>
+              </a:r>
+              <a:r>
+                <a:rPr lang="en-US" sz="1100" dirty="0"/>
+                <a:t>(_id), </a:t>
+              </a:r>
+              <a:r>
+                <a:rPr lang="en-US" sz="1100" dirty="0" err="1"/>
+                <a:t>ChatThreadData</a:t>
+              </a:r>
+              <a:r>
+                <a:rPr lang="en-US" sz="1100" dirty="0"/>
+                <a:t>(_id))</a:t>
+              </a:r>
+            </a:p>
+          </p:txBody>
+        </p:sp>
+        <p:sp>
+          <p:nvSpPr>
+            <p:cNvPr id="73" name="TextBox 72">
+              <a:extLst>
+                <a:ext uri="{FF2B5EF4-FFF2-40B4-BE49-F238E27FC236}">
+                  <a16:creationId xmlns:a16="http://schemas.microsoft.com/office/drawing/2014/main" id="{ED2D0FDD-3C79-F642-A6D7-5DD03A7040F3}"/>
+                </a:ext>
+              </a:extLst>
+            </p:cNvPr>
+            <p:cNvSpPr txBox="1"/>
+            <p:nvPr/>
+          </p:nvSpPr>
+          <p:spPr>
+            <a:xfrm>
+              <a:off x="2858036" y="1490253"/>
+              <a:ext cx="1650936" cy="288147"/>
+            </a:xfrm>
+            <a:prstGeom prst="rect">
+              <a:avLst/>
+            </a:prstGeom>
+            <a:ln>
+              <a:noFill/>
+            </a:ln>
+          </p:spPr>
+          <p:style>
+            <a:lnRef idx="2">
+              <a:schemeClr val="dk1"/>
+            </a:lnRef>
+            <a:fillRef idx="1">
+              <a:schemeClr val="lt1"/>
+            </a:fillRef>
+            <a:effectRef idx="0">
+              <a:schemeClr val="dk1"/>
+            </a:effectRef>
+            <a:fontRef idx="minor">
+              <a:schemeClr val="dk1"/>
+            </a:fontRef>
+          </p:style>
+          <p:txBody>
+            <a:bodyPr wrap="square" lIns="36000" tIns="36000" rIns="36000" bIns="36000" rtlCol="0" anchor="ctr" anchorCtr="0">
+              <a:spAutoFit/>
+            </a:bodyPr>
+            <a:lstStyle/>
+            <a:p>
+              <a:r>
+                <a:rPr lang="en-US" sz="1400" b="1" dirty="0" err="1"/>
+                <a:t>ChatUser</a:t>
+              </a:r>
+              <a:endParaRPr lang="en-US" sz="1400" b="1" dirty="0"/>
+            </a:p>
+          </p:txBody>
+        </p:sp>
+      </p:grpSp>
+      <p:grpSp>
+        <p:nvGrpSpPr>
+          <p:cNvPr id="78" name="Group 77">
+            <a:extLst>
+              <a:ext uri="{FF2B5EF4-FFF2-40B4-BE49-F238E27FC236}">
+                <a16:creationId xmlns:a16="http://schemas.microsoft.com/office/drawing/2014/main" id="{98C9A837-9801-9747-A284-B851F749F06A}"/>
+              </a:ext>
+            </a:extLst>
+          </p:cNvPr>
+          <p:cNvGrpSpPr/>
+          <p:nvPr/>
+        </p:nvGrpSpPr>
+        <p:grpSpPr>
+          <a:xfrm>
+            <a:off x="5814290" y="1489605"/>
+            <a:ext cx="2500824" cy="1819521"/>
+            <a:chOff x="5814290" y="1489605"/>
+            <a:chExt cx="2500824" cy="1819521"/>
+          </a:xfrm>
+        </p:grpSpPr>
+        <p:sp>
+          <p:nvSpPr>
+            <p:cNvPr id="20" name="TextBox 19">
+              <a:extLst>
+                <a:ext uri="{FF2B5EF4-FFF2-40B4-BE49-F238E27FC236}">
+                  <a16:creationId xmlns:a16="http://schemas.microsoft.com/office/drawing/2014/main" id="{7893A4C1-9897-6747-BB65-31E0FE2D9BFF}"/>
+                </a:ext>
+              </a:extLst>
+            </p:cNvPr>
+            <p:cNvSpPr txBox="1"/>
+            <p:nvPr/>
+          </p:nvSpPr>
+          <p:spPr>
+            <a:xfrm>
+              <a:off x="5814291" y="1930045"/>
+              <a:ext cx="1468876" cy="241980"/>
+            </a:xfrm>
+            <a:prstGeom prst="rect">
+              <a:avLst/>
+            </a:prstGeom>
+            <a:ln/>
+          </p:spPr>
+          <p:style>
+            <a:lnRef idx="2">
+              <a:schemeClr val="dk1"/>
+            </a:lnRef>
+            <a:fillRef idx="1">
+              <a:schemeClr val="lt1"/>
+            </a:fillRef>
+            <a:effectRef idx="0">
+              <a:schemeClr val="dk1"/>
+            </a:effectRef>
+            <a:fontRef idx="minor">
+              <a:schemeClr val="dk1"/>
+            </a:fontRef>
+          </p:style>
+          <p:txBody>
+            <a:bodyPr wrap="square" lIns="36000" tIns="36000" rIns="36000" bIns="36000" rtlCol="0" anchor="ctr" anchorCtr="0">
+              <a:spAutoFit/>
+            </a:bodyPr>
+            <a:lstStyle/>
+            <a:p>
+              <a:r>
+                <a:rPr lang="en-US" sz="1100" b="1" dirty="0"/>
+                <a:t>_id (</a:t>
+              </a:r>
+              <a:r>
+                <a:rPr lang="en-US" sz="1100" b="1" dirty="0" err="1"/>
+                <a:t>group_id</a:t>
+              </a:r>
+              <a:r>
+                <a:rPr lang="en-US" sz="1100" b="1" dirty="0"/>
+                <a:t>) | STRING</a:t>
+              </a:r>
+            </a:p>
+          </p:txBody>
+        </p:sp>
+        <p:sp>
+          <p:nvSpPr>
+            <p:cNvPr id="21" name="TextBox 20">
+              <a:extLst>
+                <a:ext uri="{FF2B5EF4-FFF2-40B4-BE49-F238E27FC236}">
+                  <a16:creationId xmlns:a16="http://schemas.microsoft.com/office/drawing/2014/main" id="{8B22E5FD-C963-B045-8537-5E47B406FB34}"/>
+                </a:ext>
+              </a:extLst>
+            </p:cNvPr>
+            <p:cNvSpPr txBox="1"/>
+            <p:nvPr/>
+          </p:nvSpPr>
+          <p:spPr>
+            <a:xfrm>
+              <a:off x="5814292" y="2214095"/>
+              <a:ext cx="1580002" cy="241980"/>
+            </a:xfrm>
+            <a:prstGeom prst="rect">
+              <a:avLst/>
+            </a:prstGeom>
+            <a:ln w="6350"/>
+          </p:spPr>
+          <p:style>
+            <a:lnRef idx="2">
+              <a:schemeClr val="dk1"/>
+            </a:lnRef>
+            <a:fillRef idx="1">
+              <a:schemeClr val="lt1"/>
+            </a:fillRef>
+            <a:effectRef idx="0">
+              <a:schemeClr val="dk1"/>
+            </a:effectRef>
+            <a:fontRef idx="minor">
+              <a:schemeClr val="dk1"/>
+            </a:fontRef>
+          </p:style>
+          <p:txBody>
+            <a:bodyPr wrap="square" lIns="36000" tIns="36000" rIns="36000" bIns="36000" rtlCol="0" anchor="ctr" anchorCtr="0">
+              <a:spAutoFit/>
+            </a:bodyPr>
+            <a:lstStyle/>
+            <a:p>
+              <a:r>
+                <a:rPr lang="en-US" sz="1100" dirty="0" err="1"/>
+                <a:t>group_name</a:t>
+              </a:r>
+              <a:r>
+                <a:rPr lang="en-US" sz="1100" dirty="0"/>
+                <a:t> | STRING</a:t>
+              </a:r>
+            </a:p>
+          </p:txBody>
+        </p:sp>
+        <p:sp>
+          <p:nvSpPr>
+            <p:cNvPr id="22" name="TextBox 21">
+              <a:extLst>
+                <a:ext uri="{FF2B5EF4-FFF2-40B4-BE49-F238E27FC236}">
+                  <a16:creationId xmlns:a16="http://schemas.microsoft.com/office/drawing/2014/main" id="{D5C5C189-AAE8-7646-BE29-7A4456A5D9F1}"/>
+                </a:ext>
+              </a:extLst>
+            </p:cNvPr>
+            <p:cNvSpPr txBox="1"/>
+            <p:nvPr/>
+          </p:nvSpPr>
+          <p:spPr>
+            <a:xfrm>
+              <a:off x="5814292" y="2498145"/>
+              <a:ext cx="1580002" cy="241980"/>
+            </a:xfrm>
+            <a:prstGeom prst="rect">
+              <a:avLst/>
+            </a:prstGeom>
+            <a:ln w="6350"/>
+          </p:spPr>
+          <p:style>
+            <a:lnRef idx="2">
+              <a:schemeClr val="dk1"/>
+            </a:lnRef>
+            <a:fillRef idx="1">
+              <a:schemeClr val="lt1"/>
+            </a:fillRef>
+            <a:effectRef idx="0">
+              <a:schemeClr val="dk1"/>
+            </a:effectRef>
+            <a:fontRef idx="minor">
+              <a:schemeClr val="dk1"/>
+            </a:fontRef>
+          </p:style>
+          <p:txBody>
+            <a:bodyPr wrap="square" lIns="36000" tIns="36000" rIns="36000" bIns="36000" rtlCol="0" anchor="ctr" anchorCtr="0">
+              <a:spAutoFit/>
+            </a:bodyPr>
+            <a:lstStyle/>
+            <a:p>
+              <a:r>
+                <a:rPr lang="en-US" sz="1100" dirty="0" err="1"/>
+                <a:t>group_creator</a:t>
+              </a:r>
+              <a:r>
+                <a:rPr lang="en-US" sz="1100" dirty="0"/>
+                <a:t> | STRING</a:t>
+              </a:r>
+            </a:p>
+          </p:txBody>
+        </p:sp>
+        <p:sp>
+          <p:nvSpPr>
+            <p:cNvPr id="30" name="TextBox 29">
+              <a:extLst>
+                <a:ext uri="{FF2B5EF4-FFF2-40B4-BE49-F238E27FC236}">
+                  <a16:creationId xmlns:a16="http://schemas.microsoft.com/office/drawing/2014/main" id="{FC5BB352-E43E-9942-B41E-34C442A1E192}"/>
+                </a:ext>
+              </a:extLst>
+            </p:cNvPr>
+            <p:cNvSpPr txBox="1"/>
+            <p:nvPr/>
+          </p:nvSpPr>
+          <p:spPr>
+            <a:xfrm>
+              <a:off x="5814290" y="2780984"/>
+              <a:ext cx="2500824" cy="241980"/>
+            </a:xfrm>
+            <a:prstGeom prst="rect">
+              <a:avLst/>
+            </a:prstGeom>
+            <a:ln w="6350"/>
+          </p:spPr>
+          <p:style>
+            <a:lnRef idx="2">
+              <a:schemeClr val="dk1"/>
+            </a:lnRef>
+            <a:fillRef idx="1">
+              <a:schemeClr val="lt1"/>
+            </a:fillRef>
+            <a:effectRef idx="0">
+              <a:schemeClr val="dk1"/>
+            </a:effectRef>
+            <a:fontRef idx="minor">
+              <a:schemeClr val="dk1"/>
+            </a:fontRef>
+          </p:style>
+          <p:txBody>
+            <a:bodyPr wrap="square" lIns="36000" tIns="36000" rIns="36000" bIns="36000" rtlCol="0" anchor="ctr" anchorCtr="0">
+              <a:spAutoFit/>
+            </a:bodyPr>
+            <a:lstStyle/>
+            <a:p>
+              <a:r>
+                <a:rPr lang="en-US" sz="1100" dirty="0" err="1"/>
+                <a:t>group_members</a:t>
+              </a:r>
+              <a:r>
+                <a:rPr lang="en-US" sz="1100" dirty="0"/>
+                <a:t> | Array of </a:t>
+              </a:r>
+              <a:r>
+                <a:rPr lang="en-US" sz="1100" dirty="0" err="1"/>
+                <a:t>ChatUser</a:t>
+              </a:r>
+              <a:r>
+                <a:rPr lang="en-US" sz="1100" dirty="0"/>
+                <a:t>(_id)</a:t>
+              </a:r>
+            </a:p>
+          </p:txBody>
+        </p:sp>
+        <p:sp>
+          <p:nvSpPr>
+            <p:cNvPr id="31" name="TextBox 30">
+              <a:extLst>
+                <a:ext uri="{FF2B5EF4-FFF2-40B4-BE49-F238E27FC236}">
+                  <a16:creationId xmlns:a16="http://schemas.microsoft.com/office/drawing/2014/main" id="{A5E37AD4-0D71-3948-988E-DF0882585EFA}"/>
+                </a:ext>
+              </a:extLst>
+            </p:cNvPr>
+            <p:cNvSpPr txBox="1"/>
+            <p:nvPr/>
+          </p:nvSpPr>
+          <p:spPr>
+            <a:xfrm>
+              <a:off x="5814290" y="3067146"/>
+              <a:ext cx="2500824" cy="241980"/>
+            </a:xfrm>
+            <a:prstGeom prst="rect">
+              <a:avLst/>
+            </a:prstGeom>
+            <a:ln w="6350"/>
+          </p:spPr>
+          <p:style>
+            <a:lnRef idx="2">
+              <a:schemeClr val="dk1"/>
+            </a:lnRef>
+            <a:fillRef idx="1">
+              <a:schemeClr val="lt1"/>
+            </a:fillRef>
+            <a:effectRef idx="0">
+              <a:schemeClr val="dk1"/>
+            </a:effectRef>
+            <a:fontRef idx="minor">
+              <a:schemeClr val="dk1"/>
+            </a:fontRef>
+          </p:style>
+          <p:txBody>
+            <a:bodyPr wrap="square" lIns="36000" tIns="36000" rIns="36000" bIns="36000" rtlCol="0" anchor="ctr" anchorCtr="0">
+              <a:spAutoFit/>
+            </a:bodyPr>
+            <a:lstStyle/>
+            <a:p>
+              <a:r>
+                <a:rPr lang="en-US" sz="1100" dirty="0" err="1"/>
+                <a:t>group_chat_thread</a:t>
+              </a:r>
+              <a:r>
+                <a:rPr lang="en-US" sz="1100" dirty="0"/>
+                <a:t> | </a:t>
+              </a:r>
+              <a:r>
+                <a:rPr lang="en-US" sz="1100" dirty="0" err="1"/>
+                <a:t>ChatThreadData</a:t>
+              </a:r>
+              <a:r>
+                <a:rPr lang="en-US" sz="1100" dirty="0"/>
+                <a:t>(_id)</a:t>
+              </a:r>
+            </a:p>
+          </p:txBody>
+        </p:sp>
+        <p:sp>
+          <p:nvSpPr>
+            <p:cNvPr id="74" name="TextBox 73">
+              <a:extLst>
+                <a:ext uri="{FF2B5EF4-FFF2-40B4-BE49-F238E27FC236}">
+                  <a16:creationId xmlns:a16="http://schemas.microsoft.com/office/drawing/2014/main" id="{3D0FDB27-3917-8F4A-881A-9DD068E114D7}"/>
+                </a:ext>
+              </a:extLst>
+            </p:cNvPr>
+            <p:cNvSpPr txBox="1"/>
+            <p:nvPr/>
+          </p:nvSpPr>
+          <p:spPr>
+            <a:xfrm>
+              <a:off x="5814290" y="1489605"/>
+              <a:ext cx="1650936" cy="288147"/>
+            </a:xfrm>
+            <a:prstGeom prst="rect">
+              <a:avLst/>
+            </a:prstGeom>
+            <a:ln>
+              <a:noFill/>
+            </a:ln>
+          </p:spPr>
+          <p:style>
+            <a:lnRef idx="2">
+              <a:schemeClr val="dk1"/>
+            </a:lnRef>
+            <a:fillRef idx="1">
+              <a:schemeClr val="lt1"/>
+            </a:fillRef>
+            <a:effectRef idx="0">
+              <a:schemeClr val="dk1"/>
+            </a:effectRef>
+            <a:fontRef idx="minor">
+              <a:schemeClr val="dk1"/>
+            </a:fontRef>
+          </p:style>
+          <p:txBody>
+            <a:bodyPr wrap="square" lIns="36000" tIns="36000" rIns="36000" bIns="36000" rtlCol="0" anchor="ctr" anchorCtr="0">
+              <a:spAutoFit/>
+            </a:bodyPr>
+            <a:lstStyle/>
+            <a:p>
+              <a:r>
+                <a:rPr lang="en-US" sz="1400" b="1" dirty="0" err="1"/>
+                <a:t>ChatGroup</a:t>
+              </a:r>
+              <a:endParaRPr lang="en-US" sz="1400" b="1" dirty="0"/>
+            </a:p>
+          </p:txBody>
+        </p:sp>
+      </p:grpSp>
+      <p:grpSp>
+        <p:nvGrpSpPr>
+          <p:cNvPr id="79" name="Group 78">
+            <a:extLst>
+              <a:ext uri="{FF2B5EF4-FFF2-40B4-BE49-F238E27FC236}">
+                <a16:creationId xmlns:a16="http://schemas.microsoft.com/office/drawing/2014/main" id="{8939E3D7-F2B7-F44B-BCE4-EDD5EDE01BF4}"/>
+              </a:ext>
+            </a:extLst>
+          </p:cNvPr>
+          <p:cNvGrpSpPr/>
+          <p:nvPr/>
+        </p:nvGrpSpPr>
+        <p:grpSpPr>
+          <a:xfrm>
+            <a:off x="8810378" y="1488100"/>
+            <a:ext cx="2965874" cy="2662205"/>
+            <a:chOff x="8810378" y="1488100"/>
+            <a:chExt cx="2965874" cy="2662205"/>
+          </a:xfrm>
+        </p:grpSpPr>
+        <p:sp>
+          <p:nvSpPr>
+            <p:cNvPr id="33" name="TextBox 32">
+              <a:extLst>
+                <a:ext uri="{FF2B5EF4-FFF2-40B4-BE49-F238E27FC236}">
+                  <a16:creationId xmlns:a16="http://schemas.microsoft.com/office/drawing/2014/main" id="{81CCCBAD-D1B0-404F-90D2-8F8FD2F6BCA6}"/>
+                </a:ext>
+              </a:extLst>
+            </p:cNvPr>
+            <p:cNvSpPr txBox="1"/>
+            <p:nvPr/>
+          </p:nvSpPr>
+          <p:spPr>
+            <a:xfrm>
+              <a:off x="8810378" y="1930045"/>
+              <a:ext cx="1875011" cy="241980"/>
+            </a:xfrm>
+            <a:prstGeom prst="rect">
+              <a:avLst/>
+            </a:prstGeom>
+            <a:ln/>
+          </p:spPr>
+          <p:style>
+            <a:lnRef idx="2">
+              <a:schemeClr val="dk1"/>
+            </a:lnRef>
+            <a:fillRef idx="1">
+              <a:schemeClr val="lt1"/>
+            </a:fillRef>
+            <a:effectRef idx="0">
+              <a:schemeClr val="dk1"/>
+            </a:effectRef>
+            <a:fontRef idx="minor">
+              <a:schemeClr val="dk1"/>
+            </a:fontRef>
+          </p:style>
+          <p:txBody>
+            <a:bodyPr wrap="square" lIns="36000" tIns="36000" rIns="36000" bIns="36000" rtlCol="0" anchor="ctr" anchorCtr="0">
+              <a:spAutoFit/>
+            </a:bodyPr>
+            <a:lstStyle/>
+            <a:p>
+              <a:r>
+                <a:rPr lang="en-US" sz="1100" b="1" dirty="0"/>
+                <a:t>_id (</a:t>
+              </a:r>
+              <a:r>
+                <a:rPr lang="en-US" sz="1100" b="1" dirty="0" err="1"/>
+                <a:t>chat_thread_id</a:t>
+              </a:r>
+              <a:r>
+                <a:rPr lang="en-US" sz="1100" b="1" dirty="0"/>
+                <a:t>) | STRING</a:t>
+              </a:r>
+            </a:p>
+          </p:txBody>
+        </p:sp>
+        <p:sp>
+          <p:nvSpPr>
+            <p:cNvPr id="34" name="TextBox 33">
+              <a:extLst>
+                <a:ext uri="{FF2B5EF4-FFF2-40B4-BE49-F238E27FC236}">
+                  <a16:creationId xmlns:a16="http://schemas.microsoft.com/office/drawing/2014/main" id="{30B6A3C4-A3D6-2941-8A65-9519387AED68}"/>
+                </a:ext>
+              </a:extLst>
+            </p:cNvPr>
+            <p:cNvSpPr txBox="1"/>
+            <p:nvPr/>
+          </p:nvSpPr>
+          <p:spPr>
+            <a:xfrm>
+              <a:off x="8810379" y="2214095"/>
+              <a:ext cx="2965873" cy="241980"/>
+            </a:xfrm>
+            <a:prstGeom prst="rect">
+              <a:avLst/>
+            </a:prstGeom>
+            <a:ln w="6350"/>
+          </p:spPr>
+          <p:style>
+            <a:lnRef idx="2">
+              <a:schemeClr val="dk1"/>
+            </a:lnRef>
+            <a:fillRef idx="1">
+              <a:schemeClr val="lt1"/>
+            </a:fillRef>
+            <a:effectRef idx="0">
+              <a:schemeClr val="dk1"/>
+            </a:effectRef>
+            <a:fontRef idx="minor">
+              <a:schemeClr val="dk1"/>
+            </a:fontRef>
+          </p:style>
+          <p:txBody>
+            <a:bodyPr wrap="square" lIns="36000" tIns="36000" rIns="36000" bIns="36000" rtlCol="0" anchor="ctr" anchorCtr="0">
+              <a:spAutoFit/>
+            </a:bodyPr>
+            <a:lstStyle/>
+            <a:p>
+              <a:r>
+                <a:rPr lang="en-US" sz="1100" dirty="0" err="1"/>
+                <a:t>chat_thread_category</a:t>
+              </a:r>
+              <a:r>
+                <a:rPr lang="en-US" sz="1100" dirty="0"/>
+                <a:t> | STRING (Personal/Group)</a:t>
+              </a:r>
+            </a:p>
+          </p:txBody>
+        </p:sp>
+        <p:sp>
+          <p:nvSpPr>
+            <p:cNvPr id="35" name="TextBox 34">
+              <a:extLst>
+                <a:ext uri="{FF2B5EF4-FFF2-40B4-BE49-F238E27FC236}">
+                  <a16:creationId xmlns:a16="http://schemas.microsoft.com/office/drawing/2014/main" id="{DB831D0A-2B86-0E42-B378-43061820E3DB}"/>
+                </a:ext>
+              </a:extLst>
+            </p:cNvPr>
+            <p:cNvSpPr txBox="1"/>
+            <p:nvPr/>
+          </p:nvSpPr>
+          <p:spPr>
+            <a:xfrm>
+              <a:off x="8810379" y="2498145"/>
+              <a:ext cx="1979283" cy="241980"/>
+            </a:xfrm>
+            <a:prstGeom prst="rect">
+              <a:avLst/>
+            </a:prstGeom>
+            <a:ln w="6350"/>
+          </p:spPr>
+          <p:style>
+            <a:lnRef idx="2">
+              <a:schemeClr val="dk1"/>
+            </a:lnRef>
+            <a:fillRef idx="1">
+              <a:schemeClr val="lt1"/>
+            </a:fillRef>
+            <a:effectRef idx="0">
+              <a:schemeClr val="dk1"/>
+            </a:effectRef>
+            <a:fontRef idx="minor">
+              <a:schemeClr val="dk1"/>
+            </a:fontRef>
+          </p:style>
+          <p:txBody>
+            <a:bodyPr wrap="square" lIns="36000" tIns="36000" rIns="36000" bIns="36000" rtlCol="0" anchor="ctr" anchorCtr="0">
+              <a:spAutoFit/>
+            </a:bodyPr>
+            <a:lstStyle/>
+            <a:p>
+              <a:r>
+                <a:rPr lang="en-US" sz="1100" dirty="0" err="1"/>
+                <a:t>chat_first_created</a:t>
+              </a:r>
+              <a:r>
+                <a:rPr lang="en-US" sz="1100" dirty="0"/>
+                <a:t> | TIMESTAMP</a:t>
+              </a:r>
+            </a:p>
+          </p:txBody>
+        </p:sp>
+        <p:sp>
+          <p:nvSpPr>
+            <p:cNvPr id="36" name="TextBox 35">
+              <a:extLst>
+                <a:ext uri="{FF2B5EF4-FFF2-40B4-BE49-F238E27FC236}">
+                  <a16:creationId xmlns:a16="http://schemas.microsoft.com/office/drawing/2014/main" id="{CC53FA1A-4D94-2B4E-86DD-C43119A1DB78}"/>
+                </a:ext>
+              </a:extLst>
+            </p:cNvPr>
+            <p:cNvSpPr txBox="1"/>
+            <p:nvPr/>
+          </p:nvSpPr>
+          <p:spPr>
+            <a:xfrm>
+              <a:off x="8810379" y="2780984"/>
+              <a:ext cx="1979283" cy="241980"/>
+            </a:xfrm>
+            <a:prstGeom prst="rect">
+              <a:avLst/>
+            </a:prstGeom>
+            <a:ln w="6350"/>
+          </p:spPr>
+          <p:style>
+            <a:lnRef idx="2">
+              <a:schemeClr val="dk1"/>
+            </a:lnRef>
+            <a:fillRef idx="1">
+              <a:schemeClr val="lt1"/>
+            </a:fillRef>
+            <a:effectRef idx="0">
+              <a:schemeClr val="dk1"/>
+            </a:effectRef>
+            <a:fontRef idx="minor">
+              <a:schemeClr val="dk1"/>
+            </a:fontRef>
+          </p:style>
+          <p:txBody>
+            <a:bodyPr wrap="square" lIns="36000" tIns="36000" rIns="36000" bIns="36000" rtlCol="0" anchor="ctr" anchorCtr="0">
+              <a:spAutoFit/>
+            </a:bodyPr>
+            <a:lstStyle/>
+            <a:p>
+              <a:r>
+                <a:rPr lang="en-US" sz="1100" dirty="0" err="1"/>
+                <a:t>chat_last_updated</a:t>
+              </a:r>
+              <a:r>
+                <a:rPr lang="en-US" sz="1100" dirty="0"/>
+                <a:t> | TIMESTAMP</a:t>
+              </a:r>
+            </a:p>
+          </p:txBody>
+        </p:sp>
+        <p:sp>
+          <p:nvSpPr>
+            <p:cNvPr id="37" name="TextBox 36">
+              <a:extLst>
+                <a:ext uri="{FF2B5EF4-FFF2-40B4-BE49-F238E27FC236}">
+                  <a16:creationId xmlns:a16="http://schemas.microsoft.com/office/drawing/2014/main" id="{D8DD710D-BCB5-5041-AAD0-E121F590AF44}"/>
+                </a:ext>
+              </a:extLst>
+            </p:cNvPr>
+            <p:cNvSpPr txBox="1"/>
+            <p:nvPr/>
+          </p:nvSpPr>
+          <p:spPr>
+            <a:xfrm>
+              <a:off x="8810378" y="3061939"/>
+              <a:ext cx="2965873" cy="1088366"/>
+            </a:xfrm>
+            <a:prstGeom prst="rect">
+              <a:avLst/>
+            </a:prstGeom>
+            <a:ln/>
+          </p:spPr>
+          <p:style>
+            <a:lnRef idx="2">
+              <a:schemeClr val="accent6">
+                <a:shade val="50000"/>
+              </a:schemeClr>
+            </a:lnRef>
+            <a:fillRef idx="1">
+              <a:schemeClr val="accent6"/>
+            </a:fillRef>
+            <a:effectRef idx="0">
+              <a:schemeClr val="accent6"/>
+            </a:effectRef>
+            <a:fontRef idx="minor">
+              <a:schemeClr val="lt1"/>
+            </a:fontRef>
+          </p:style>
+          <p:txBody>
+            <a:bodyPr wrap="square" lIns="36000" tIns="36000" rIns="36000" bIns="36000" rtlCol="0" anchor="t" anchorCtr="0">
+              <a:spAutoFit/>
+            </a:bodyPr>
+            <a:lstStyle/>
+            <a:p>
+              <a:r>
+                <a:rPr lang="en-US" sz="1100" dirty="0" err="1"/>
+                <a:t>chat_text_history</a:t>
+              </a:r>
+              <a:r>
+                <a:rPr lang="en-US" sz="1100" dirty="0"/>
+                <a:t> | Array of – </a:t>
+              </a:r>
+            </a:p>
+            <a:p>
+              <a:r>
+                <a:rPr lang="en-US" sz="1100" dirty="0"/>
+                <a:t>                     {</a:t>
+              </a:r>
+            </a:p>
+            <a:p>
+              <a:r>
+                <a:rPr lang="en-US" sz="1100" dirty="0"/>
+                <a:t>	</a:t>
+              </a:r>
+              <a:r>
+                <a:rPr lang="en-US" sz="1100" dirty="0" err="1"/>
+                <a:t>message_time</a:t>
+              </a:r>
+              <a:r>
+                <a:rPr lang="en-US" sz="1100" dirty="0"/>
+                <a:t> | TIMESTAMP</a:t>
+              </a:r>
+            </a:p>
+            <a:p>
+              <a:r>
+                <a:rPr lang="en-US" sz="1100" dirty="0"/>
+                <a:t>	from | </a:t>
+              </a:r>
+              <a:r>
+                <a:rPr lang="en-US" sz="1100" dirty="0" err="1"/>
+                <a:t>ChatUser</a:t>
+              </a:r>
+              <a:r>
+                <a:rPr lang="en-US" sz="1100" dirty="0"/>
+                <a:t>(_id)</a:t>
+              </a:r>
+            </a:p>
+            <a:p>
+              <a:r>
+                <a:rPr lang="en-US" sz="1100" dirty="0"/>
+                <a:t>	</a:t>
+              </a:r>
+              <a:r>
+                <a:rPr lang="en-US" sz="1100" dirty="0" err="1"/>
+                <a:t>message_content</a:t>
+              </a:r>
+              <a:r>
+                <a:rPr lang="en-US" sz="1100" dirty="0"/>
+                <a:t> | STRING</a:t>
+              </a:r>
+            </a:p>
+            <a:p>
+              <a:r>
+                <a:rPr lang="en-US" sz="1100" dirty="0"/>
+                <a:t>                     }</a:t>
+              </a:r>
+            </a:p>
+          </p:txBody>
+        </p:sp>
+        <p:sp>
+          <p:nvSpPr>
+            <p:cNvPr id="75" name="TextBox 74">
+              <a:extLst>
+                <a:ext uri="{FF2B5EF4-FFF2-40B4-BE49-F238E27FC236}">
+                  <a16:creationId xmlns:a16="http://schemas.microsoft.com/office/drawing/2014/main" id="{3945DDA3-E4C9-254C-AB2E-EC35930D8753}"/>
+                </a:ext>
+              </a:extLst>
+            </p:cNvPr>
+            <p:cNvSpPr txBox="1"/>
+            <p:nvPr/>
+          </p:nvSpPr>
+          <p:spPr>
+            <a:xfrm>
+              <a:off x="8812606" y="1488100"/>
+              <a:ext cx="1650936" cy="288147"/>
+            </a:xfrm>
+            <a:prstGeom prst="rect">
+              <a:avLst/>
+            </a:prstGeom>
+            <a:ln>
+              <a:noFill/>
+            </a:ln>
+          </p:spPr>
+          <p:style>
+            <a:lnRef idx="2">
+              <a:schemeClr val="dk1"/>
+            </a:lnRef>
+            <a:fillRef idx="1">
+              <a:schemeClr val="lt1"/>
+            </a:fillRef>
+            <a:effectRef idx="0">
+              <a:schemeClr val="dk1"/>
+            </a:effectRef>
+            <a:fontRef idx="minor">
+              <a:schemeClr val="dk1"/>
+            </a:fontRef>
+          </p:style>
+          <p:txBody>
+            <a:bodyPr wrap="square" lIns="36000" tIns="36000" rIns="36000" bIns="36000" rtlCol="0" anchor="ctr" anchorCtr="0">
+              <a:spAutoFit/>
+            </a:bodyPr>
+            <a:lstStyle/>
+            <a:p>
+              <a:r>
+                <a:rPr lang="en-US" sz="1400" b="1" dirty="0" err="1"/>
+                <a:t>ChatThreadData</a:t>
+              </a:r>
+              <a:endParaRPr lang="en-US" sz="1400" b="1" dirty="0"/>
+            </a:p>
+          </p:txBody>
+        </p:sp>
+      </p:grpSp>
     </p:spTree>
     <p:extLst>
       <p:ext uri="{BB962C8B-B14F-4D97-AF65-F5344CB8AC3E}">
         <p14:creationId xmlns:p14="http://schemas.microsoft.com/office/powerpoint/2010/main" val="3298946290"/>
+      </p:ext>
+    </p:extLst>
+  </p:cSld>
+  <p:clrMapOvr>
+    <a:masterClrMapping/>
+  </p:clrMapOvr>
+</p:sld>
+</file>
+
+<file path=ppt/slides/slide3.xml><?xml version="1.0" encoding="utf-8"?>
+<p:sld xmlns:a="http://schemas.openxmlformats.org/drawingml/2006/main" xmlns:r="http://schemas.openxmlformats.org/officeDocument/2006/relationships" xmlns:p="http://schemas.openxmlformats.org/presentationml/2006/main">
+  <p:cSld>
+    <p:spTree>
+      <p:nvGrpSpPr>
+        <p:cNvPr id="1" name=""/>
+        <p:cNvGrpSpPr/>
+        <p:nvPr/>
+      </p:nvGrpSpPr>
+      <p:grpSpPr>
+        <a:xfrm>
+          <a:off x="0" y="0"/>
+          <a:ext cx="0" cy="0"/>
+          <a:chOff x="0" y="0"/>
+          <a:chExt cx="0" cy="0"/>
+        </a:xfrm>
+      </p:grpSpPr>
+      <p:sp>
+        <p:nvSpPr>
+          <p:cNvPr id="4" name="Title 1">
+            <a:extLst>
+              <a:ext uri="{FF2B5EF4-FFF2-40B4-BE49-F238E27FC236}">
+                <a16:creationId xmlns:a16="http://schemas.microsoft.com/office/drawing/2014/main" id="{B661ECC4-337A-5A40-8AF4-B4695D9C1C19}"/>
+              </a:ext>
+            </a:extLst>
+          </p:cNvPr>
+          <p:cNvSpPr>
+            <a:spLocks noGrp="1"/>
+          </p:cNvSpPr>
+          <p:nvPr>
+            <p:ph type="title"/>
+          </p:nvPr>
+        </p:nvSpPr>
+        <p:spPr>
+          <a:xfrm>
+            <a:off x="265413" y="344626"/>
+            <a:ext cx="10515600" cy="657763"/>
+          </a:xfrm>
+        </p:spPr>
+        <p:txBody>
+          <a:bodyPr>
+            <a:normAutofit/>
+          </a:bodyPr>
+          <a:lstStyle/>
+          <a:p>
+            <a:r>
+              <a:rPr lang="en-US" sz="3600" dirty="0"/>
+              <a:t>REST  Data Operations</a:t>
+            </a:r>
+          </a:p>
+        </p:txBody>
+      </p:sp>
+    </p:spTree>
+    <p:extLst>
+      <p:ext uri="{BB962C8B-B14F-4D97-AF65-F5344CB8AC3E}">
+        <p14:creationId xmlns:p14="http://schemas.microsoft.com/office/powerpoint/2010/main" val="3111119319"/>
       </p:ext>
     </p:extLst>
   </p:cSld>

</xml_diff>